<commit_message>
Upload da segunda versão Pitch com logo adicionada
</commit_message>
<xml_diff>
--- a/pastaDocumentos/Pitch.pptx
+++ b/pastaDocumentos/Pitch.pptx
@@ -104,6 +104,11 @@
       </a:defRPr>
     </a:lvl9pPr>
   </p:defaultTextStyle>
+  <p:extLst>
+    <p:ext uri="{EFAFB233-063F-42B5-8137-9DF3F51BA10A}">
+      <p15:sldGuideLst xmlns:p15="http://schemas.microsoft.com/office/powerpoint/2012/main"/>
+    </p:ext>
+  </p:extLst>
 </p:presentation>
 </file>
 
@@ -3387,6 +3392,131 @@
           </a:p>
         </p:txBody>
       </p:sp>
+      <p:sp>
+        <p:nvSpPr>
+          <p:cNvPr id="4" name="Freeform: Shape 3">
+            <a:extLst>
+              <a:ext uri="{FF2B5EF4-FFF2-40B4-BE49-F238E27FC236}">
+                <a16:creationId xmlns:a16="http://schemas.microsoft.com/office/drawing/2014/main" id="{40884CA0-6F4E-4860-A2CC-D22B5402FE78}"/>
+              </a:ext>
+            </a:extLst>
+          </p:cNvPr>
+          <p:cNvSpPr/>
+          <p:nvPr/>
+        </p:nvSpPr>
+        <p:spPr>
+          <a:xfrm>
+            <a:off x="7439073" y="2778695"/>
+            <a:ext cx="2422380" cy="1990252"/>
+          </a:xfrm>
+          <a:custGeom>
+            <a:avLst/>
+            <a:gdLst>
+              <a:gd name="connsiteX0" fmla="*/ 2422380 w 2422380"/>
+              <a:gd name="connsiteY0" fmla="*/ 541280 h 1990252"/>
+              <a:gd name="connsiteX1" fmla="*/ 2141026 w 2422380"/>
+              <a:gd name="connsiteY1" fmla="*/ 119249 h 1990252"/>
+              <a:gd name="connsiteX2" fmla="*/ 1184423 w 2422380"/>
+              <a:gd name="connsiteY2" fmla="*/ 189588 h 1990252"/>
+              <a:gd name="connsiteX3" fmla="*/ 677986 w 2422380"/>
+              <a:gd name="connsiteY3" fmla="*/ 1343138 h 1990252"/>
+              <a:gd name="connsiteX4" fmla="*/ 466971 w 2422380"/>
+              <a:gd name="connsiteY4" fmla="*/ 1990252 h 1990252"/>
+              <a:gd name="connsiteX5" fmla="*/ 87143 w 2422380"/>
+              <a:gd name="connsiteY5" fmla="*/ 1807372 h 1990252"/>
+              <a:gd name="connsiteX6" fmla="*/ 2737 w 2422380"/>
+              <a:gd name="connsiteY6" fmla="*/ 1357206 h 1990252"/>
+            </a:gdLst>
+            <a:ahLst/>
+            <a:cxnLst>
+              <a:cxn ang="0">
+                <a:pos x="connsiteX0" y="connsiteY0"/>
+              </a:cxn>
+              <a:cxn ang="0">
+                <a:pos x="connsiteX1" y="connsiteY1"/>
+              </a:cxn>
+              <a:cxn ang="0">
+                <a:pos x="connsiteX2" y="connsiteY2"/>
+              </a:cxn>
+              <a:cxn ang="0">
+                <a:pos x="connsiteX3" y="connsiteY3"/>
+              </a:cxn>
+              <a:cxn ang="0">
+                <a:pos x="connsiteX4" y="connsiteY4"/>
+              </a:cxn>
+              <a:cxn ang="0">
+                <a:pos x="connsiteX5" y="connsiteY5"/>
+              </a:cxn>
+              <a:cxn ang="0">
+                <a:pos x="connsiteX6" y="connsiteY6"/>
+              </a:cxn>
+            </a:cxnLst>
+            <a:rect l="l" t="t" r="r" b="b"/>
+            <a:pathLst>
+              <a:path w="2422380" h="1990252">
+                <a:moveTo>
+                  <a:pt x="2422380" y="541280"/>
+                </a:moveTo>
+                <a:cubicBezTo>
+                  <a:pt x="2328595" y="400603"/>
+                  <a:pt x="2282841" y="211304"/>
+                  <a:pt x="2141026" y="119249"/>
+                </a:cubicBezTo>
+                <a:cubicBezTo>
+                  <a:pt x="1766371" y="-123948"/>
+                  <a:pt x="1521239" y="59207"/>
+                  <a:pt x="1184423" y="189588"/>
+                </a:cubicBezTo>
+                <a:cubicBezTo>
+                  <a:pt x="861789" y="770330"/>
+                  <a:pt x="884165" y="661853"/>
+                  <a:pt x="677986" y="1343138"/>
+                </a:cubicBezTo>
+                <a:cubicBezTo>
+                  <a:pt x="472020" y="2023722"/>
+                  <a:pt x="695465" y="1533261"/>
+                  <a:pt x="466971" y="1990252"/>
+                </a:cubicBezTo>
+                <a:cubicBezTo>
+                  <a:pt x="340362" y="1929292"/>
+                  <a:pt x="192697" y="1900132"/>
+                  <a:pt x="87143" y="1807372"/>
+                </a:cubicBezTo>
+                <a:cubicBezTo>
+                  <a:pt x="-23607" y="1710046"/>
+                  <a:pt x="2737" y="1477018"/>
+                  <a:pt x="2737" y="1357206"/>
+                </a:cubicBezTo>
+              </a:path>
+            </a:pathLst>
+          </a:custGeom>
+          <a:noFill/>
+        </p:spPr>
+        <p:style>
+          <a:lnRef idx="2">
+            <a:schemeClr val="accent1">
+              <a:shade val="50000"/>
+            </a:schemeClr>
+          </a:lnRef>
+          <a:fillRef idx="1">
+            <a:schemeClr val="accent1"/>
+          </a:fillRef>
+          <a:effectRef idx="0">
+            <a:schemeClr val="accent1"/>
+          </a:effectRef>
+          <a:fontRef idx="minor">
+            <a:schemeClr val="lt1"/>
+          </a:fontRef>
+        </p:style>
+        <p:txBody>
+          <a:bodyPr rtlCol="0" anchor="ctr"/>
+          <a:lstStyle/>
+          <a:p>
+            <a:pPr algn="ctr"/>
+            <a:endParaRPr lang="en-US"/>
+          </a:p>
+        </p:txBody>
+      </p:sp>
     </p:spTree>
     <p:extLst>
       <p:ext uri="{BB962C8B-B14F-4D97-AF65-F5344CB8AC3E}">

</xml_diff>